<commit_message>
Added App dev 2 part
</commit_message>
<xml_diff>
--- a/Spring 2025 Presentation/Spring 2025.pptx
+++ b/Spring 2025 Presentation/Spring 2025.pptx
@@ -6,8 +6,9 @@
   </p:sldMasterIdLst>
   <p:sldIdLst>
     <p:sldId id="256" r:id="rId2"/>
-    <p:sldId id="257" r:id="rId3"/>
-    <p:sldId id="258" r:id="rId4"/>
+    <p:sldId id="259" r:id="rId3"/>
+    <p:sldId id="257" r:id="rId4"/>
+    <p:sldId id="258" r:id="rId5"/>
   </p:sldIdLst>
   <p:sldSz cx="12192000" cy="6858000"/>
   <p:notesSz cx="6858000" cy="9144000"/>
@@ -117,7 +118,7 @@
 <file path=ppt/revisionInfo.xml><?xml version="1.0" encoding="utf-8"?>
 <p1510:revInfo xmlns:a="http://schemas.openxmlformats.org/drawingml/2006/main" xmlns:r="http://schemas.openxmlformats.org/officeDocument/2006/relationships" xmlns:p1510="http://schemas.microsoft.com/office/powerpoint/2015/10/main">
   <p1510:revLst>
-    <p1510:client id="{632C56FB-C9C2-27CD-1E26-9A55B2CA372E}" v="310" dt="2025-06-25T16:32:07.461"/>
+    <p1510:client id="{632C56FB-C9C2-27CD-1E26-9A55B2CA372E}" v="419" dt="2025-06-25T16:36:27.368"/>
   </p1510:revLst>
 </p1510:revInfo>
 </file>
@@ -158,8 +159,8 @@
   </pc:docChgLst>
   <pc:docChgLst>
     <pc:chgData name="Charlie Hatch" userId="S::chatch@npitx.org::23189b92-0f8f-4e9b-8c97-6a52adbe72b1" providerId="AD" clId="Web-{632C56FB-C9C2-27CD-1E26-9A55B2CA372E}"/>
-    <pc:docChg chg="addSld modSld">
-      <pc:chgData name="Charlie Hatch" userId="S::chatch@npitx.org::23189b92-0f8f-4e9b-8c97-6a52adbe72b1" providerId="AD" clId="Web-{632C56FB-C9C2-27CD-1E26-9A55B2CA372E}" dt="2025-06-25T16:32:07.461" v="287" actId="20577"/>
+    <pc:docChg chg="addSld modSld sldOrd">
+      <pc:chgData name="Charlie Hatch" userId="S::chatch@npitx.org::23189b92-0f8f-4e9b-8c97-6a52adbe72b1" providerId="AD" clId="Web-{632C56FB-C9C2-27CD-1E26-9A55B2CA372E}" dt="2025-06-25T16:36:27.368" v="396" actId="20577"/>
       <pc:docMkLst>
         <pc:docMk/>
       </pc:docMkLst>
@@ -237,6 +238,29 @@
             <pc:docMk/>
             <pc:sldMk cId="1083871575" sldId="258"/>
             <ac:spMk id="3" creationId="{CEB97E69-BAEE-F25D-0D34-38136D6BA6E7}"/>
+          </ac:spMkLst>
+        </pc:spChg>
+      </pc:sldChg>
+      <pc:sldChg chg="modSp new ord">
+        <pc:chgData name="Charlie Hatch" userId="S::chatch@npitx.org::23189b92-0f8f-4e9b-8c97-6a52adbe72b1" providerId="AD" clId="Web-{632C56FB-C9C2-27CD-1E26-9A55B2CA372E}" dt="2025-06-25T16:36:27.368" v="396" actId="20577"/>
+        <pc:sldMkLst>
+          <pc:docMk/>
+          <pc:sldMk cId="666310823" sldId="259"/>
+        </pc:sldMkLst>
+        <pc:spChg chg="mod">
+          <ac:chgData name="Charlie Hatch" userId="S::chatch@npitx.org::23189b92-0f8f-4e9b-8c97-6a52adbe72b1" providerId="AD" clId="Web-{632C56FB-C9C2-27CD-1E26-9A55B2CA372E}" dt="2025-06-25T16:33:55.774" v="295" actId="20577"/>
+          <ac:spMkLst>
+            <pc:docMk/>
+            <pc:sldMk cId="666310823" sldId="259"/>
+            <ac:spMk id="2" creationId="{1C7FB501-7AC2-3C6C-87C4-4680E334474B}"/>
+          </ac:spMkLst>
+        </pc:spChg>
+        <pc:spChg chg="mod">
+          <ac:chgData name="Charlie Hatch" userId="S::chatch@npitx.org::23189b92-0f8f-4e9b-8c97-6a52adbe72b1" providerId="AD" clId="Web-{632C56FB-C9C2-27CD-1E26-9A55B2CA372E}" dt="2025-06-25T16:36:27.368" v="396" actId="20577"/>
+          <ac:spMkLst>
+            <pc:docMk/>
+            <pc:sldMk cId="666310823" sldId="259"/>
+            <ac:spMk id="3" creationId="{26A07511-EC0C-F09E-CA97-141954CAC495}"/>
           </ac:spMkLst>
         </pc:spChg>
       </pc:sldChg>
@@ -3410,6 +3434,122 @@
           <p:cNvPr id="2" name="Title 1">
             <a:extLst>
               <a:ext uri="{FF2B5EF4-FFF2-40B4-BE49-F238E27FC236}">
+                <a16:creationId xmlns:a16="http://schemas.microsoft.com/office/drawing/2014/main" id="{1C7FB501-7AC2-3C6C-87C4-4680E334474B}"/>
+              </a:ext>
+            </a:extLst>
+          </p:cNvPr>
+          <p:cNvSpPr>
+            <a:spLocks noGrp="1"/>
+          </p:cNvSpPr>
+          <p:nvPr>
+            <p:ph type="title"/>
+          </p:nvPr>
+        </p:nvSpPr>
+        <p:spPr/>
+        <p:txBody>
+          <a:bodyPr/>
+          <a:lstStyle/>
+          <a:p>
+            <a:r>
+              <a:rPr lang="en-US"/>
+              <a:t>App Dev 2  </a:t>
+            </a:r>
+          </a:p>
+        </p:txBody>
+      </p:sp>
+      <p:sp>
+        <p:nvSpPr>
+          <p:cNvPr id="3" name="Content Placeholder 2">
+            <a:extLst>
+              <a:ext uri="{FF2B5EF4-FFF2-40B4-BE49-F238E27FC236}">
+                <a16:creationId xmlns:a16="http://schemas.microsoft.com/office/drawing/2014/main" id="{26A07511-EC0C-F09E-CA97-141954CAC495}"/>
+              </a:ext>
+            </a:extLst>
+          </p:cNvPr>
+          <p:cNvSpPr>
+            <a:spLocks noGrp="1"/>
+          </p:cNvSpPr>
+          <p:nvPr>
+            <p:ph idx="1"/>
+          </p:nvPr>
+        </p:nvSpPr>
+        <p:spPr/>
+        <p:txBody>
+          <a:bodyPr vert="horz" lIns="91440" tIns="45720" rIns="91440" bIns="45720" rtlCol="0" anchor="t">
+            <a:normAutofit/>
+          </a:bodyPr>
+          <a:lstStyle/>
+          <a:p>
+            <a:r>
+              <a:rPr lang="en-US"/>
+              <a:t>Worked on an address book</a:t>
+            </a:r>
+          </a:p>
+          <a:p>
+            <a:pPr lvl="1">
+              <a:buFont typeface="Courier New" panose="020B0604020202020204" pitchFamily="34" charset="0"/>
+              <a:buChar char="o"/>
+            </a:pPr>
+            <a:r>
+              <a:rPr lang="en-US"/>
+              <a:t>Learned more about classes</a:t>
+            </a:r>
+            <a:endParaRPr lang="en-US" dirty="0"/>
+          </a:p>
+          <a:p>
+            <a:pPr lvl="1">
+              <a:buFont typeface="Courier New" panose="020B0604020202020204" pitchFamily="34" charset="0"/>
+              <a:buChar char="o"/>
+            </a:pPr>
+            <a:r>
+              <a:rPr lang="en-US"/>
+              <a:t>Figured out how to put code into classes, thereby allowing the organization of code within multiple files</a:t>
+            </a:r>
+          </a:p>
+          <a:p>
+            <a:r>
+              <a:rPr lang="en-US"/>
+              <a:t>Realized even moreso how bad I am at UI design...</a:t>
+            </a:r>
+            <a:endParaRPr lang="en-US" dirty="0"/>
+          </a:p>
+        </p:txBody>
+      </p:sp>
+    </p:spTree>
+    <p:extLst>
+      <p:ext uri="{BB962C8B-B14F-4D97-AF65-F5344CB8AC3E}">
+        <p14:creationId xmlns:p14="http://schemas.microsoft.com/office/powerpoint/2010/main" val="666310823"/>
+      </p:ext>
+    </p:extLst>
+  </p:cSld>
+  <p:clrMapOvr>
+    <a:masterClrMapping/>
+  </p:clrMapOvr>
+</p:sld>
+</file>
+
+<file path=ppt/slides/slide3.xml><?xml version="1.0" encoding="utf-8"?>
+<p:sld xmlns:a="http://schemas.openxmlformats.org/drawingml/2006/main" xmlns:r="http://schemas.openxmlformats.org/officeDocument/2006/relationships" xmlns:p="http://schemas.openxmlformats.org/presentationml/2006/main">
+  <p:cSld>
+    <p:spTree>
+      <p:nvGrpSpPr>
+        <p:cNvPr id="1" name=""/>
+        <p:cNvGrpSpPr/>
+        <p:nvPr/>
+      </p:nvGrpSpPr>
+      <p:grpSpPr>
+        <a:xfrm>
+          <a:off x="0" y="0"/>
+          <a:ext cx="0" cy="0"/>
+          <a:chOff x="0" y="0"/>
+          <a:chExt cx="0" cy="0"/>
+        </a:xfrm>
+      </p:grpSpPr>
+      <p:sp>
+        <p:nvSpPr>
+          <p:cNvPr id="2" name="Title 1">
+            <a:extLst>
+              <a:ext uri="{FF2B5EF4-FFF2-40B4-BE49-F238E27FC236}">
                 <a16:creationId xmlns:a16="http://schemas.microsoft.com/office/drawing/2014/main" id="{06D6AB15-30CE-F14A-99C8-7C2206384D83}"/>
               </a:ext>
             </a:extLst>
@@ -3500,7 +3640,7 @@
 </p:sld>
 </file>
 
-<file path=ppt/slides/slide3.xml><?xml version="1.0" encoding="utf-8"?>
+<file path=ppt/slides/slide4.xml><?xml version="1.0" encoding="utf-8"?>
 <p:sld xmlns:a="http://schemas.openxmlformats.org/drawingml/2006/main" xmlns:r="http://schemas.openxmlformats.org/officeDocument/2006/relationships" xmlns:p="http://schemas.openxmlformats.org/presentationml/2006/main">
   <p:cSld>
     <p:spTree>

</xml_diff>